<commit_message>
added one more slide
</commit_message>
<xml_diff>
--- a/Market making.pptx
+++ b/Market making.pptx
@@ -299,7 +299,7 @@
           <a:p>
             <a:fld id="{48A87A34-81AB-432B-8DAE-1953F412C126}" type="datetimeFigureOut">
               <a:rPr lang="en-US" dirty="0"/>
-              <a:t>5/5/2017</a:t>
+              <a:t>5/7/2017</a:t>
             </a:fld>
             <a:endParaRPr lang="en-US" dirty="0"/>
           </a:p>
@@ -606,7 +606,7 @@
           <a:p>
             <a:fld id="{48A87A34-81AB-432B-8DAE-1953F412C126}" type="datetimeFigureOut">
               <a:rPr lang="en-US" dirty="0"/>
-              <a:t>5/5/2017</a:t>
+              <a:t>5/7/2017</a:t>
             </a:fld>
             <a:endParaRPr lang="en-US" dirty="0"/>
           </a:p>
@@ -823,7 +823,7 @@
           <a:p>
             <a:fld id="{48A87A34-81AB-432B-8DAE-1953F412C126}" type="datetimeFigureOut">
               <a:rPr lang="en-US" dirty="0"/>
-              <a:t>5/5/2017</a:t>
+              <a:t>5/7/2017</a:t>
             </a:fld>
             <a:endParaRPr lang="en-US" dirty="0"/>
           </a:p>
@@ -1109,7 +1109,7 @@
           <a:p>
             <a:fld id="{48A87A34-81AB-432B-8DAE-1953F412C126}" type="datetimeFigureOut">
               <a:rPr lang="en-US" dirty="0"/>
-              <a:t>5/5/2017</a:t>
+              <a:t>5/7/2017</a:t>
             </a:fld>
             <a:endParaRPr lang="en-US" dirty="0"/>
           </a:p>
@@ -1558,7 +1558,7 @@
           <a:p>
             <a:fld id="{48A87A34-81AB-432B-8DAE-1953F412C126}" type="datetimeFigureOut">
               <a:rPr lang="en-US" dirty="0"/>
-              <a:t>5/5/2017</a:t>
+              <a:t>5/7/2017</a:t>
             </a:fld>
             <a:endParaRPr lang="en-US" dirty="0"/>
           </a:p>
@@ -2129,7 +2129,7 @@
           <a:p>
             <a:fld id="{48A87A34-81AB-432B-8DAE-1953F412C126}" type="datetimeFigureOut">
               <a:rPr lang="en-US" dirty="0"/>
-              <a:t>5/5/2017</a:t>
+              <a:t>5/7/2017</a:t>
             </a:fld>
             <a:endParaRPr lang="en-US" dirty="0"/>
           </a:p>
@@ -2976,7 +2976,7 @@
           <a:p>
             <a:fld id="{48A87A34-81AB-432B-8DAE-1953F412C126}" type="datetimeFigureOut">
               <a:rPr lang="en-US" dirty="0"/>
-              <a:t>5/5/2017</a:t>
+              <a:t>5/7/2017</a:t>
             </a:fld>
             <a:endParaRPr lang="en-US" dirty="0"/>
           </a:p>
@@ -3176,7 +3176,7 @@
           <a:p>
             <a:fld id="{48A87A34-81AB-432B-8DAE-1953F412C126}" type="datetimeFigureOut">
               <a:rPr lang="en-US" dirty="0"/>
-              <a:t>5/5/2017</a:t>
+              <a:t>5/7/2017</a:t>
             </a:fld>
             <a:endParaRPr lang="en-US" dirty="0"/>
           </a:p>
@@ -3385,7 +3385,7 @@
           <a:p>
             <a:fld id="{48A87A34-81AB-432B-8DAE-1953F412C126}" type="datetimeFigureOut">
               <a:rPr lang="en-US" dirty="0"/>
-              <a:t>5/5/2017</a:t>
+              <a:t>5/7/2017</a:t>
             </a:fld>
             <a:endParaRPr lang="en-US" dirty="0"/>
           </a:p>
@@ -3585,7 +3585,7 @@
           <a:p>
             <a:fld id="{48A87A34-81AB-432B-8DAE-1953F412C126}" type="datetimeFigureOut">
               <a:rPr lang="en-US" dirty="0"/>
-              <a:t>5/5/2017</a:t>
+              <a:t>5/7/2017</a:t>
             </a:fld>
             <a:endParaRPr lang="en-US" dirty="0"/>
           </a:p>
@@ -3860,7 +3860,7 @@
           <a:p>
             <a:fld id="{48A87A34-81AB-432B-8DAE-1953F412C126}" type="datetimeFigureOut">
               <a:rPr lang="en-US" dirty="0"/>
-              <a:t>5/5/2017</a:t>
+              <a:t>5/7/2017</a:t>
             </a:fld>
             <a:endParaRPr lang="en-US" dirty="0"/>
           </a:p>
@@ -4122,7 +4122,7 @@
           <a:p>
             <a:fld id="{48A87A34-81AB-432B-8DAE-1953F412C126}" type="datetimeFigureOut">
               <a:rPr lang="en-US" dirty="0"/>
-              <a:t>5/5/2017</a:t>
+              <a:t>5/7/2017</a:t>
             </a:fld>
             <a:endParaRPr lang="en-US" dirty="0"/>
           </a:p>
@@ -4532,7 +4532,7 @@
           <a:p>
             <a:fld id="{48A87A34-81AB-432B-8DAE-1953F412C126}" type="datetimeFigureOut">
               <a:rPr lang="en-US" dirty="0"/>
-              <a:t>5/5/2017</a:t>
+              <a:t>5/7/2017</a:t>
             </a:fld>
             <a:endParaRPr lang="en-US" dirty="0"/>
           </a:p>
@@ -4675,7 +4675,7 @@
           <a:p>
             <a:fld id="{48A87A34-81AB-432B-8DAE-1953F412C126}" type="datetimeFigureOut">
               <a:rPr lang="en-US" dirty="0"/>
-              <a:t>5/5/2017</a:t>
+              <a:t>5/7/2017</a:t>
             </a:fld>
             <a:endParaRPr lang="en-US" dirty="0"/>
           </a:p>
@@ -4795,7 +4795,7 @@
           <a:p>
             <a:fld id="{48A87A34-81AB-432B-8DAE-1953F412C126}" type="datetimeFigureOut">
               <a:rPr lang="en-US" dirty="0"/>
-              <a:t>5/5/2017</a:t>
+              <a:t>5/7/2017</a:t>
             </a:fld>
             <a:endParaRPr lang="en-US" dirty="0"/>
           </a:p>
@@ -5069,7 +5069,7 @@
           <a:p>
             <a:fld id="{48A87A34-81AB-432B-8DAE-1953F412C126}" type="datetimeFigureOut">
               <a:rPr lang="en-US" dirty="0"/>
-              <a:t>5/5/2017</a:t>
+              <a:t>5/7/2017</a:t>
             </a:fld>
             <a:endParaRPr lang="en-US" dirty="0"/>
           </a:p>
@@ -5376,7 +5376,7 @@
           <a:p>
             <a:fld id="{48A87A34-81AB-432B-8DAE-1953F412C126}" type="datetimeFigureOut">
               <a:rPr lang="en-US" dirty="0"/>
-              <a:t>5/5/2017</a:t>
+              <a:t>5/7/2017</a:t>
             </a:fld>
             <a:endParaRPr lang="en-US" dirty="0"/>
           </a:p>
@@ -5625,7 +5625,7 @@
             <a:fld id="{48A87A34-81AB-432B-8DAE-1953F412C126}" type="datetimeFigureOut">
               <a:rPr lang="en-US" dirty="0"/>
               <a:pPr/>
-              <a:t>5/5/2017</a:t>
+              <a:t>5/7/2017</a:t>
             </a:fld>
             <a:endParaRPr lang="en-US" dirty="0"/>
           </a:p>
@@ -6104,11 +6104,7 @@
           <a:p>
             <a:r>
               <a:rPr lang="en-CA" dirty="0"/>
-              <a:t>Kevin Chen, </a:t>
-            </a:r>
-            <a:r>
-              <a:rPr lang="en-CA" dirty="0"/>
-              <a:t>Kapil </a:t>
+              <a:t>Kevin Chen, Kapil </a:t>
             </a:r>
             <a:r>
               <a:rPr lang="en-CA" dirty="0" err="1"/>
@@ -6118,7 +6114,6 @@
               <a:rPr lang="en-CA" dirty="0"/>
               <a:t>, Yu Wu</a:t>
             </a:r>
-            <a:endParaRPr lang="en-CA" dirty="0"/>
           </a:p>
         </p:txBody>
       </p:sp>
@@ -7473,7 +7468,12 @@
             <p:ph type="title"/>
           </p:nvPr>
         </p:nvSpPr>
-        <p:spPr/>
+        <p:spPr>
+          <a:xfrm>
+            <a:off x="591655" y="146030"/>
+            <a:ext cx="10364451" cy="1596177"/>
+          </a:xfrm>
+        </p:spPr>
         <p:txBody>
           <a:bodyPr/>
           <a:lstStyle/>
@@ -7485,6 +7485,510 @@
           </a:p>
         </p:txBody>
       </p:sp>
+      <p:sp>
+        <p:nvSpPr>
+          <p:cNvPr id="3" name="Flowchart: Decision 2"/>
+          <p:cNvSpPr/>
+          <p:nvPr/>
+        </p:nvSpPr>
+        <p:spPr>
+          <a:xfrm>
+            <a:off x="6096000" y="2847107"/>
+            <a:ext cx="2299855" cy="1233054"/>
+          </a:xfrm>
+          <a:prstGeom prst="flowChartDecision">
+            <a:avLst/>
+          </a:prstGeom>
+        </p:spPr>
+        <p:style>
+          <a:lnRef idx="2">
+            <a:schemeClr val="accent1">
+              <a:shade val="50000"/>
+            </a:schemeClr>
+          </a:lnRef>
+          <a:fillRef idx="1">
+            <a:schemeClr val="accent1"/>
+          </a:fillRef>
+          <a:effectRef idx="0">
+            <a:schemeClr val="accent1"/>
+          </a:effectRef>
+          <a:fontRef idx="minor">
+            <a:schemeClr val="lt1"/>
+          </a:fontRef>
+        </p:style>
+        <p:txBody>
+          <a:bodyPr rtlCol="0" anchor="ctr"/>
+          <a:lstStyle/>
+          <a:p>
+            <a:pPr algn="ctr"/>
+            <a:r>
+              <a:rPr lang="en-CA" dirty="0"/>
+              <a:t>Posted Orders Expired?</a:t>
+            </a:r>
+          </a:p>
+        </p:txBody>
+      </p:sp>
+      <p:sp>
+        <p:nvSpPr>
+          <p:cNvPr id="4" name="Flowchart: Decision 3"/>
+          <p:cNvSpPr/>
+          <p:nvPr/>
+        </p:nvSpPr>
+        <p:spPr>
+          <a:xfrm>
+            <a:off x="0" y="2783028"/>
+            <a:ext cx="2646218" cy="1420091"/>
+          </a:xfrm>
+          <a:prstGeom prst="flowChartDecision">
+            <a:avLst/>
+          </a:prstGeom>
+        </p:spPr>
+        <p:style>
+          <a:lnRef idx="2">
+            <a:schemeClr val="accent1">
+              <a:shade val="50000"/>
+            </a:schemeClr>
+          </a:lnRef>
+          <a:fillRef idx="1">
+            <a:schemeClr val="accent1"/>
+          </a:fillRef>
+          <a:effectRef idx="0">
+            <a:schemeClr val="accent1"/>
+          </a:effectRef>
+          <a:fontRef idx="minor">
+            <a:schemeClr val="lt1"/>
+          </a:fontRef>
+        </p:style>
+        <p:txBody>
+          <a:bodyPr rtlCol="0" anchor="ctr"/>
+          <a:lstStyle/>
+          <a:p>
+            <a:pPr algn="ctr"/>
+            <a:r>
+              <a:rPr lang="en-CA" dirty="0"/>
+              <a:t>Outstanding Orders?</a:t>
+            </a:r>
+          </a:p>
+        </p:txBody>
+      </p:sp>
+      <p:sp>
+        <p:nvSpPr>
+          <p:cNvPr id="6" name="Flowchart: Decision 5"/>
+          <p:cNvSpPr/>
+          <p:nvPr/>
+        </p:nvSpPr>
+        <p:spPr>
+          <a:xfrm>
+            <a:off x="3141518" y="2757054"/>
+            <a:ext cx="2286000" cy="1378525"/>
+          </a:xfrm>
+          <a:prstGeom prst="flowChartDecision">
+            <a:avLst/>
+          </a:prstGeom>
+        </p:spPr>
+        <p:style>
+          <a:lnRef idx="2">
+            <a:schemeClr val="accent1">
+              <a:shade val="50000"/>
+            </a:schemeClr>
+          </a:lnRef>
+          <a:fillRef idx="1">
+            <a:schemeClr val="accent1"/>
+          </a:fillRef>
+          <a:effectRef idx="0">
+            <a:schemeClr val="accent1"/>
+          </a:effectRef>
+          <a:fontRef idx="minor">
+            <a:schemeClr val="lt1"/>
+          </a:fontRef>
+        </p:style>
+        <p:txBody>
+          <a:bodyPr rtlCol="0" anchor="ctr"/>
+          <a:lstStyle/>
+          <a:p>
+            <a:pPr algn="ctr"/>
+            <a:r>
+              <a:rPr lang="en-CA" dirty="0"/>
+              <a:t>New Execution?</a:t>
+            </a:r>
+          </a:p>
+        </p:txBody>
+      </p:sp>
+      <p:sp>
+        <p:nvSpPr>
+          <p:cNvPr id="7" name="Rectangle 6"/>
+          <p:cNvSpPr/>
+          <p:nvPr/>
+        </p:nvSpPr>
+        <p:spPr>
+          <a:xfrm>
+            <a:off x="3390901" y="4464629"/>
+            <a:ext cx="1821872" cy="1163782"/>
+          </a:xfrm>
+          <a:prstGeom prst="rect">
+            <a:avLst/>
+          </a:prstGeom>
+        </p:spPr>
+        <p:style>
+          <a:lnRef idx="2">
+            <a:schemeClr val="accent1">
+              <a:shade val="50000"/>
+            </a:schemeClr>
+          </a:lnRef>
+          <a:fillRef idx="1">
+            <a:schemeClr val="accent1"/>
+          </a:fillRef>
+          <a:effectRef idx="0">
+            <a:schemeClr val="accent1"/>
+          </a:effectRef>
+          <a:fontRef idx="minor">
+            <a:schemeClr val="lt1"/>
+          </a:fontRef>
+        </p:style>
+        <p:txBody>
+          <a:bodyPr rtlCol="0" anchor="ctr"/>
+          <a:lstStyle/>
+          <a:p>
+            <a:pPr algn="ctr"/>
+            <a:r>
+              <a:rPr lang="en-CA" dirty="0"/>
+              <a:t>Extend Timer for outstanding orders</a:t>
+            </a:r>
+          </a:p>
+        </p:txBody>
+      </p:sp>
+      <p:sp>
+        <p:nvSpPr>
+          <p:cNvPr id="8" name="Rectangle 7"/>
+          <p:cNvSpPr/>
+          <p:nvPr/>
+        </p:nvSpPr>
+        <p:spPr>
+          <a:xfrm>
+            <a:off x="6286499" y="1494553"/>
+            <a:ext cx="1925782" cy="1163782"/>
+          </a:xfrm>
+          <a:prstGeom prst="rect">
+            <a:avLst/>
+          </a:prstGeom>
+        </p:spPr>
+        <p:style>
+          <a:lnRef idx="2">
+            <a:schemeClr val="accent1">
+              <a:shade val="50000"/>
+            </a:schemeClr>
+          </a:lnRef>
+          <a:fillRef idx="1">
+            <a:schemeClr val="accent1"/>
+          </a:fillRef>
+          <a:effectRef idx="0">
+            <a:schemeClr val="accent1"/>
+          </a:effectRef>
+          <a:fontRef idx="minor">
+            <a:schemeClr val="lt1"/>
+          </a:fontRef>
+        </p:style>
+        <p:txBody>
+          <a:bodyPr rtlCol="0" anchor="ctr"/>
+          <a:lstStyle/>
+          <a:p>
+            <a:pPr algn="ctr"/>
+            <a:r>
+              <a:rPr lang="en-CA" dirty="0"/>
+              <a:t>Cancel Outstanding Orders</a:t>
+            </a:r>
+          </a:p>
+        </p:txBody>
+      </p:sp>
+      <p:cxnSp>
+        <p:nvCxnSpPr>
+          <p:cNvPr id="10" name="Straight Arrow Connector 9"/>
+          <p:cNvCxnSpPr>
+            <a:stCxn id="4" idx="3"/>
+            <a:endCxn id="6" idx="1"/>
+          </p:cNvCxnSpPr>
+          <p:nvPr/>
+        </p:nvCxnSpPr>
+        <p:spPr>
+          <a:xfrm flipV="1">
+            <a:off x="2646218" y="3446317"/>
+            <a:ext cx="495300" cy="46757"/>
+          </a:xfrm>
+          <a:prstGeom prst="straightConnector1">
+            <a:avLst/>
+          </a:prstGeom>
+          <a:ln>
+            <a:tailEnd type="triangle"/>
+          </a:ln>
+        </p:spPr>
+        <p:style>
+          <a:lnRef idx="1">
+            <a:schemeClr val="accent1"/>
+          </a:lnRef>
+          <a:fillRef idx="0">
+            <a:schemeClr val="accent1"/>
+          </a:fillRef>
+          <a:effectRef idx="0">
+            <a:schemeClr val="accent1"/>
+          </a:effectRef>
+          <a:fontRef idx="minor">
+            <a:schemeClr val="tx1"/>
+          </a:fontRef>
+        </p:style>
+      </p:cxnSp>
+      <p:cxnSp>
+        <p:nvCxnSpPr>
+          <p:cNvPr id="12" name="Straight Arrow Connector 11"/>
+          <p:cNvCxnSpPr>
+            <a:stCxn id="6" idx="3"/>
+            <a:endCxn id="3" idx="1"/>
+          </p:cNvCxnSpPr>
+          <p:nvPr/>
+        </p:nvCxnSpPr>
+        <p:spPr>
+          <a:xfrm>
+            <a:off x="5427518" y="3446317"/>
+            <a:ext cx="668482" cy="17317"/>
+          </a:xfrm>
+          <a:prstGeom prst="straightConnector1">
+            <a:avLst/>
+          </a:prstGeom>
+          <a:ln>
+            <a:tailEnd type="triangle"/>
+          </a:ln>
+        </p:spPr>
+        <p:style>
+          <a:lnRef idx="1">
+            <a:schemeClr val="accent1"/>
+          </a:lnRef>
+          <a:fillRef idx="0">
+            <a:schemeClr val="accent1"/>
+          </a:fillRef>
+          <a:effectRef idx="0">
+            <a:schemeClr val="accent1"/>
+          </a:effectRef>
+          <a:fontRef idx="minor">
+            <a:schemeClr val="tx1"/>
+          </a:fontRef>
+        </p:style>
+      </p:cxnSp>
+      <p:cxnSp>
+        <p:nvCxnSpPr>
+          <p:cNvPr id="14" name="Straight Arrow Connector 13"/>
+          <p:cNvCxnSpPr>
+            <a:stCxn id="6" idx="2"/>
+            <a:endCxn id="7" idx="0"/>
+          </p:cNvCxnSpPr>
+          <p:nvPr/>
+        </p:nvCxnSpPr>
+        <p:spPr>
+          <a:xfrm>
+            <a:off x="4284518" y="4135579"/>
+            <a:ext cx="17319" cy="329050"/>
+          </a:xfrm>
+          <a:prstGeom prst="straightConnector1">
+            <a:avLst/>
+          </a:prstGeom>
+          <a:ln>
+            <a:tailEnd type="triangle"/>
+          </a:ln>
+        </p:spPr>
+        <p:style>
+          <a:lnRef idx="1">
+            <a:schemeClr val="accent1"/>
+          </a:lnRef>
+          <a:fillRef idx="0">
+            <a:schemeClr val="accent1"/>
+          </a:fillRef>
+          <a:effectRef idx="0">
+            <a:schemeClr val="accent1"/>
+          </a:effectRef>
+          <a:fontRef idx="minor">
+            <a:schemeClr val="tx1"/>
+          </a:fontRef>
+        </p:style>
+      </p:cxnSp>
+      <p:cxnSp>
+        <p:nvCxnSpPr>
+          <p:cNvPr id="16" name="Straight Arrow Connector 15"/>
+          <p:cNvCxnSpPr>
+            <a:stCxn id="3" idx="0"/>
+            <a:endCxn id="8" idx="2"/>
+          </p:cNvCxnSpPr>
+          <p:nvPr/>
+        </p:nvCxnSpPr>
+        <p:spPr>
+          <a:xfrm flipV="1">
+            <a:off x="7245928" y="2658335"/>
+            <a:ext cx="3462" cy="188772"/>
+          </a:xfrm>
+          <a:prstGeom prst="straightConnector1">
+            <a:avLst/>
+          </a:prstGeom>
+          <a:ln>
+            <a:tailEnd type="triangle"/>
+          </a:ln>
+        </p:spPr>
+        <p:style>
+          <a:lnRef idx="1">
+            <a:schemeClr val="accent1"/>
+          </a:lnRef>
+          <a:fillRef idx="0">
+            <a:schemeClr val="accent1"/>
+          </a:fillRef>
+          <a:effectRef idx="0">
+            <a:schemeClr val="accent1"/>
+          </a:effectRef>
+          <a:fontRef idx="minor">
+            <a:schemeClr val="tx1"/>
+          </a:fontRef>
+        </p:style>
+      </p:cxnSp>
+      <p:cxnSp>
+        <p:nvCxnSpPr>
+          <p:cNvPr id="18" name="Straight Arrow Connector 17"/>
+          <p:cNvCxnSpPr>
+            <a:stCxn id="3" idx="3"/>
+          </p:cNvCxnSpPr>
+          <p:nvPr/>
+        </p:nvCxnSpPr>
+        <p:spPr>
+          <a:xfrm flipV="1">
+            <a:off x="8395855" y="3463632"/>
+            <a:ext cx="2882371" cy="2"/>
+          </a:xfrm>
+          <a:prstGeom prst="straightConnector1">
+            <a:avLst/>
+          </a:prstGeom>
+          <a:ln>
+            <a:tailEnd type="triangle"/>
+          </a:ln>
+        </p:spPr>
+        <p:style>
+          <a:lnRef idx="1">
+            <a:schemeClr val="accent1"/>
+          </a:lnRef>
+          <a:fillRef idx="0">
+            <a:schemeClr val="accent1"/>
+          </a:fillRef>
+          <a:effectRef idx="0">
+            <a:schemeClr val="accent1"/>
+          </a:effectRef>
+          <a:fontRef idx="minor">
+            <a:schemeClr val="tx1"/>
+          </a:fontRef>
+        </p:style>
+      </p:cxnSp>
+      <p:cxnSp>
+        <p:nvCxnSpPr>
+          <p:cNvPr id="20" name="Connector: Elbow 19"/>
+          <p:cNvCxnSpPr>
+            <a:stCxn id="8" idx="3"/>
+          </p:cNvCxnSpPr>
+          <p:nvPr/>
+        </p:nvCxnSpPr>
+        <p:spPr>
+          <a:xfrm>
+            <a:off x="8212281" y="2076444"/>
+            <a:ext cx="2985655" cy="1489368"/>
+          </a:xfrm>
+          <a:prstGeom prst="bentConnector3">
+            <a:avLst/>
+          </a:prstGeom>
+          <a:ln>
+            <a:tailEnd type="triangle"/>
+          </a:ln>
+        </p:spPr>
+        <p:style>
+          <a:lnRef idx="1">
+            <a:schemeClr val="accent1"/>
+          </a:lnRef>
+          <a:fillRef idx="0">
+            <a:schemeClr val="accent1"/>
+          </a:fillRef>
+          <a:effectRef idx="0">
+            <a:schemeClr val="accent1"/>
+          </a:effectRef>
+          <a:fontRef idx="minor">
+            <a:schemeClr val="tx1"/>
+          </a:fontRef>
+        </p:style>
+      </p:cxnSp>
+      <p:cxnSp>
+        <p:nvCxnSpPr>
+          <p:cNvPr id="22" name="Connector: Elbow 21"/>
+          <p:cNvCxnSpPr>
+            <a:stCxn id="7" idx="3"/>
+          </p:cNvCxnSpPr>
+          <p:nvPr/>
+        </p:nvCxnSpPr>
+        <p:spPr>
+          <a:xfrm flipV="1">
+            <a:off x="5212773" y="3453245"/>
+            <a:ext cx="5960919" cy="1593275"/>
+          </a:xfrm>
+          <a:prstGeom prst="bentConnector3">
+            <a:avLst>
+              <a:gd name="adj1" fmla="val 75567"/>
+            </a:avLst>
+          </a:prstGeom>
+          <a:ln>
+            <a:tailEnd type="triangle"/>
+          </a:ln>
+        </p:spPr>
+        <p:style>
+          <a:lnRef idx="1">
+            <a:schemeClr val="accent1"/>
+          </a:lnRef>
+          <a:fillRef idx="0">
+            <a:schemeClr val="accent1"/>
+          </a:fillRef>
+          <a:effectRef idx="0">
+            <a:schemeClr val="accent1"/>
+          </a:effectRef>
+          <a:fontRef idx="minor">
+            <a:schemeClr val="tx1"/>
+          </a:fontRef>
+        </p:style>
+      </p:cxnSp>
+      <p:cxnSp>
+        <p:nvCxnSpPr>
+          <p:cNvPr id="26" name="Connector: Elbow 25"/>
+          <p:cNvCxnSpPr>
+            <a:stCxn id="4" idx="2"/>
+          </p:cNvCxnSpPr>
+          <p:nvPr/>
+        </p:nvCxnSpPr>
+        <p:spPr>
+          <a:xfrm rot="5400000" flipH="1" flipV="1">
+            <a:off x="5614554" y="-798372"/>
+            <a:ext cx="710046" cy="9292936"/>
+          </a:xfrm>
+          <a:prstGeom prst="bentConnector4">
+            <a:avLst>
+              <a:gd name="adj1" fmla="val -244878"/>
+              <a:gd name="adj2" fmla="val 90216"/>
+            </a:avLst>
+          </a:prstGeom>
+          <a:ln>
+            <a:tailEnd type="triangle"/>
+          </a:ln>
+        </p:spPr>
+        <p:style>
+          <a:lnRef idx="1">
+            <a:schemeClr val="accent1"/>
+          </a:lnRef>
+          <a:fillRef idx="0">
+            <a:schemeClr val="accent1"/>
+          </a:fillRef>
+          <a:effectRef idx="0">
+            <a:schemeClr val="accent1"/>
+          </a:effectRef>
+          <a:fontRef idx="minor">
+            <a:schemeClr val="tx1"/>
+          </a:fontRef>
+        </p:style>
+      </p:cxnSp>
     </p:spTree>
     <p:extLst>
       <p:ext uri="{BB962C8B-B14F-4D97-AF65-F5344CB8AC3E}">

</xml_diff>

<commit_message>
Global and signal generating flowcharts
</commit_message>
<xml_diff>
--- a/Market making.pptx
+++ b/Market making.pptx
@@ -128,6 +128,10 @@
 </p:presentation>
 </file>
 
+<file path=ppt/revisionInfo.xml><?xml version="1.0" encoding="utf-8"?>
+<p1510:revInfo xmlns:a="http://schemas.openxmlformats.org/drawingml/2006/main" xmlns:r="http://schemas.openxmlformats.org/officeDocument/2006/relationships" xmlns:p1510="http://schemas.microsoft.com/office/powerpoint/2015/10/main"/>
+</file>
+
 <file path=ppt/slideLayouts/slideLayout1.xml><?xml version="1.0" encoding="utf-8"?>
 <p:sldLayout xmlns:a="http://schemas.openxmlformats.org/drawingml/2006/main" xmlns:r="http://schemas.openxmlformats.org/officeDocument/2006/relationships" xmlns:p="http://schemas.openxmlformats.org/presentationml/2006/main" type="title" preserve="1">
   <p:cSld name="Title Slide">
@@ -299,7 +303,7 @@
           <a:p>
             <a:fld id="{48A87A34-81AB-432B-8DAE-1953F412C126}" type="datetimeFigureOut">
               <a:rPr lang="en-US" dirty="0"/>
-              <a:t>5/5/2017</a:t>
+              <a:t>5/7/2017</a:t>
             </a:fld>
             <a:endParaRPr lang="en-US" dirty="0"/>
           </a:p>
@@ -341,7 +345,7 @@
           <a:p>
             <a:fld id="{6D22F896-40B5-4ADD-8801-0D06FADFA095}" type="slidenum">
               <a:rPr lang="en-US" dirty="0"/>
-              <a:t>‹#›</a:t>
+              <a:t>‹N°›</a:t>
             </a:fld>
             <a:endParaRPr lang="en-US" dirty="0"/>
           </a:p>
@@ -606,7 +610,7 @@
           <a:p>
             <a:fld id="{48A87A34-81AB-432B-8DAE-1953F412C126}" type="datetimeFigureOut">
               <a:rPr lang="en-US" dirty="0"/>
-              <a:t>5/5/2017</a:t>
+              <a:t>5/7/2017</a:t>
             </a:fld>
             <a:endParaRPr lang="en-US" dirty="0"/>
           </a:p>
@@ -648,7 +652,7 @@
           <a:p>
             <a:fld id="{6D22F896-40B5-4ADD-8801-0D06FADFA095}" type="slidenum">
               <a:rPr lang="en-US" dirty="0"/>
-              <a:t>‹#›</a:t>
+              <a:t>‹N°›</a:t>
             </a:fld>
             <a:endParaRPr lang="en-US" dirty="0"/>
           </a:p>
@@ -823,7 +827,7 @@
           <a:p>
             <a:fld id="{48A87A34-81AB-432B-8DAE-1953F412C126}" type="datetimeFigureOut">
               <a:rPr lang="en-US" dirty="0"/>
-              <a:t>5/5/2017</a:t>
+              <a:t>5/7/2017</a:t>
             </a:fld>
             <a:endParaRPr lang="en-US" dirty="0"/>
           </a:p>
@@ -865,7 +869,7 @@
           <a:p>
             <a:fld id="{6D22F896-40B5-4ADD-8801-0D06FADFA095}" type="slidenum">
               <a:rPr lang="en-US" dirty="0"/>
-              <a:t>‹#›</a:t>
+              <a:t>‹N°›</a:t>
             </a:fld>
             <a:endParaRPr lang="en-US" dirty="0"/>
           </a:p>
@@ -1109,7 +1113,7 @@
           <a:p>
             <a:fld id="{48A87A34-81AB-432B-8DAE-1953F412C126}" type="datetimeFigureOut">
               <a:rPr lang="en-US" dirty="0"/>
-              <a:t>5/5/2017</a:t>
+              <a:t>5/7/2017</a:t>
             </a:fld>
             <a:endParaRPr lang="en-US" dirty="0"/>
           </a:p>
@@ -1151,7 +1155,7 @@
           <a:p>
             <a:fld id="{6D22F896-40B5-4ADD-8801-0D06FADFA095}" type="slidenum">
               <a:rPr lang="en-US" dirty="0"/>
-              <a:t>‹#›</a:t>
+              <a:t>‹N°›</a:t>
             </a:fld>
             <a:endParaRPr lang="en-US" dirty="0"/>
           </a:p>
@@ -1558,7 +1562,7 @@
           <a:p>
             <a:fld id="{48A87A34-81AB-432B-8DAE-1953F412C126}" type="datetimeFigureOut">
               <a:rPr lang="en-US" dirty="0"/>
-              <a:t>5/5/2017</a:t>
+              <a:t>5/7/2017</a:t>
             </a:fld>
             <a:endParaRPr lang="en-US" dirty="0"/>
           </a:p>
@@ -1600,7 +1604,7 @@
           <a:p>
             <a:fld id="{6D22F896-40B5-4ADD-8801-0D06FADFA095}" type="slidenum">
               <a:rPr lang="en-US" dirty="0"/>
-              <a:t>‹#›</a:t>
+              <a:t>‹N°›</a:t>
             </a:fld>
             <a:endParaRPr lang="en-US" dirty="0"/>
           </a:p>
@@ -2129,7 +2133,7 @@
           <a:p>
             <a:fld id="{48A87A34-81AB-432B-8DAE-1953F412C126}" type="datetimeFigureOut">
               <a:rPr lang="en-US" dirty="0"/>
-              <a:t>5/5/2017</a:t>
+              <a:t>5/7/2017</a:t>
             </a:fld>
             <a:endParaRPr lang="en-US" dirty="0"/>
           </a:p>
@@ -2171,7 +2175,7 @@
           <a:p>
             <a:fld id="{6D22F896-40B5-4ADD-8801-0D06FADFA095}" type="slidenum">
               <a:rPr lang="en-US" dirty="0"/>
-              <a:t>‹#›</a:t>
+              <a:t>‹N°›</a:t>
             </a:fld>
             <a:endParaRPr lang="en-US" dirty="0"/>
           </a:p>
@@ -2976,7 +2980,7 @@
           <a:p>
             <a:fld id="{48A87A34-81AB-432B-8DAE-1953F412C126}" type="datetimeFigureOut">
               <a:rPr lang="en-US" dirty="0"/>
-              <a:t>5/5/2017</a:t>
+              <a:t>5/7/2017</a:t>
             </a:fld>
             <a:endParaRPr lang="en-US" dirty="0"/>
           </a:p>
@@ -3018,7 +3022,7 @@
           <a:p>
             <a:fld id="{6D22F896-40B5-4ADD-8801-0D06FADFA095}" type="slidenum">
               <a:rPr lang="en-US" dirty="0"/>
-              <a:t>‹#›</a:t>
+              <a:t>‹N°›</a:t>
             </a:fld>
             <a:endParaRPr lang="en-US" dirty="0"/>
           </a:p>
@@ -3176,7 +3180,7 @@
           <a:p>
             <a:fld id="{48A87A34-81AB-432B-8DAE-1953F412C126}" type="datetimeFigureOut">
               <a:rPr lang="en-US" dirty="0"/>
-              <a:t>5/5/2017</a:t>
+              <a:t>5/7/2017</a:t>
             </a:fld>
             <a:endParaRPr lang="en-US" dirty="0"/>
           </a:p>
@@ -3218,7 +3222,7 @@
           <a:p>
             <a:fld id="{6D22F896-40B5-4ADD-8801-0D06FADFA095}" type="slidenum">
               <a:rPr lang="en-US" dirty="0"/>
-              <a:t>‹#›</a:t>
+              <a:t>‹N°›</a:t>
             </a:fld>
             <a:endParaRPr lang="en-US" dirty="0"/>
           </a:p>
@@ -3385,7 +3389,7 @@
           <a:p>
             <a:fld id="{48A87A34-81AB-432B-8DAE-1953F412C126}" type="datetimeFigureOut">
               <a:rPr lang="en-US" dirty="0"/>
-              <a:t>5/5/2017</a:t>
+              <a:t>5/7/2017</a:t>
             </a:fld>
             <a:endParaRPr lang="en-US" dirty="0"/>
           </a:p>
@@ -3427,7 +3431,7 @@
           <a:p>
             <a:fld id="{6D22F896-40B5-4ADD-8801-0D06FADFA095}" type="slidenum">
               <a:rPr lang="en-US" dirty="0"/>
-              <a:t>‹#›</a:t>
+              <a:t>‹N°›</a:t>
             </a:fld>
             <a:endParaRPr lang="en-US" dirty="0"/>
           </a:p>
@@ -3585,7 +3589,7 @@
           <a:p>
             <a:fld id="{48A87A34-81AB-432B-8DAE-1953F412C126}" type="datetimeFigureOut">
               <a:rPr lang="en-US" dirty="0"/>
-              <a:t>5/5/2017</a:t>
+              <a:t>5/7/2017</a:t>
             </a:fld>
             <a:endParaRPr lang="en-US" dirty="0"/>
           </a:p>
@@ -3627,7 +3631,7 @@
           <a:p>
             <a:fld id="{6D22F896-40B5-4ADD-8801-0D06FADFA095}" type="slidenum">
               <a:rPr lang="en-US" dirty="0"/>
-              <a:t>‹#›</a:t>
+              <a:t>‹N°›</a:t>
             </a:fld>
             <a:endParaRPr lang="en-US" dirty="0"/>
           </a:p>
@@ -3860,7 +3864,7 @@
           <a:p>
             <a:fld id="{48A87A34-81AB-432B-8DAE-1953F412C126}" type="datetimeFigureOut">
               <a:rPr lang="en-US" dirty="0"/>
-              <a:t>5/5/2017</a:t>
+              <a:t>5/7/2017</a:t>
             </a:fld>
             <a:endParaRPr lang="en-US" dirty="0"/>
           </a:p>
@@ -3902,7 +3906,7 @@
           <a:p>
             <a:fld id="{6D22F896-40B5-4ADD-8801-0D06FADFA095}" type="slidenum">
               <a:rPr lang="en-US" dirty="0"/>
-              <a:t>‹#›</a:t>
+              <a:t>‹N°›</a:t>
             </a:fld>
             <a:endParaRPr lang="en-US" dirty="0"/>
           </a:p>
@@ -4122,7 +4126,7 @@
           <a:p>
             <a:fld id="{48A87A34-81AB-432B-8DAE-1953F412C126}" type="datetimeFigureOut">
               <a:rPr lang="en-US" dirty="0"/>
-              <a:t>5/5/2017</a:t>
+              <a:t>5/7/2017</a:t>
             </a:fld>
             <a:endParaRPr lang="en-US" dirty="0"/>
           </a:p>
@@ -4164,7 +4168,7 @@
           <a:p>
             <a:fld id="{6D22F896-40B5-4ADD-8801-0D06FADFA095}" type="slidenum">
               <a:rPr lang="en-US" dirty="0"/>
-              <a:t>‹#›</a:t>
+              <a:t>‹N°›</a:t>
             </a:fld>
             <a:endParaRPr lang="en-US" dirty="0"/>
           </a:p>
@@ -4532,7 +4536,7 @@
           <a:p>
             <a:fld id="{48A87A34-81AB-432B-8DAE-1953F412C126}" type="datetimeFigureOut">
               <a:rPr lang="en-US" dirty="0"/>
-              <a:t>5/5/2017</a:t>
+              <a:t>5/7/2017</a:t>
             </a:fld>
             <a:endParaRPr lang="en-US" dirty="0"/>
           </a:p>
@@ -4574,7 +4578,7 @@
           <a:p>
             <a:fld id="{6D22F896-40B5-4ADD-8801-0D06FADFA095}" type="slidenum">
               <a:rPr lang="en-US" dirty="0"/>
-              <a:t>‹#›</a:t>
+              <a:t>‹N°›</a:t>
             </a:fld>
             <a:endParaRPr lang="en-US" dirty="0"/>
           </a:p>
@@ -4675,7 +4679,7 @@
           <a:p>
             <a:fld id="{48A87A34-81AB-432B-8DAE-1953F412C126}" type="datetimeFigureOut">
               <a:rPr lang="en-US" dirty="0"/>
-              <a:t>5/5/2017</a:t>
+              <a:t>5/7/2017</a:t>
             </a:fld>
             <a:endParaRPr lang="en-US" dirty="0"/>
           </a:p>
@@ -4717,7 +4721,7 @@
           <a:p>
             <a:fld id="{6D22F896-40B5-4ADD-8801-0D06FADFA095}" type="slidenum">
               <a:rPr lang="en-US" dirty="0"/>
-              <a:t>‹#›</a:t>
+              <a:t>‹N°›</a:t>
             </a:fld>
             <a:endParaRPr lang="en-US" dirty="0"/>
           </a:p>
@@ -4795,7 +4799,7 @@
           <a:p>
             <a:fld id="{48A87A34-81AB-432B-8DAE-1953F412C126}" type="datetimeFigureOut">
               <a:rPr lang="en-US" dirty="0"/>
-              <a:t>5/5/2017</a:t>
+              <a:t>5/7/2017</a:t>
             </a:fld>
             <a:endParaRPr lang="en-US" dirty="0"/>
           </a:p>
@@ -4837,7 +4841,7 @@
           <a:p>
             <a:fld id="{6D22F896-40B5-4ADD-8801-0D06FADFA095}" type="slidenum">
               <a:rPr lang="en-US" dirty="0"/>
-              <a:t>‹#›</a:t>
+              <a:t>‹N°›</a:t>
             </a:fld>
             <a:endParaRPr lang="en-US" dirty="0"/>
           </a:p>
@@ -5069,7 +5073,7 @@
           <a:p>
             <a:fld id="{48A87A34-81AB-432B-8DAE-1953F412C126}" type="datetimeFigureOut">
               <a:rPr lang="en-US" dirty="0"/>
-              <a:t>5/5/2017</a:t>
+              <a:t>5/7/2017</a:t>
             </a:fld>
             <a:endParaRPr lang="en-US" dirty="0"/>
           </a:p>
@@ -5111,7 +5115,7 @@
           <a:p>
             <a:fld id="{6D22F896-40B5-4ADD-8801-0D06FADFA095}" type="slidenum">
               <a:rPr lang="en-US" dirty="0"/>
-              <a:t>‹#›</a:t>
+              <a:t>‹N°›</a:t>
             </a:fld>
             <a:endParaRPr lang="en-US" dirty="0"/>
           </a:p>
@@ -5376,7 +5380,7 @@
           <a:p>
             <a:fld id="{48A87A34-81AB-432B-8DAE-1953F412C126}" type="datetimeFigureOut">
               <a:rPr lang="en-US" dirty="0"/>
-              <a:t>5/5/2017</a:t>
+              <a:t>5/7/2017</a:t>
             </a:fld>
             <a:endParaRPr lang="en-US" dirty="0"/>
           </a:p>
@@ -5418,7 +5422,7 @@
           <a:p>
             <a:fld id="{6D22F896-40B5-4ADD-8801-0D06FADFA095}" type="slidenum">
               <a:rPr lang="en-US" dirty="0"/>
-              <a:t>‹#›</a:t>
+              <a:t>‹N°›</a:t>
             </a:fld>
             <a:endParaRPr lang="en-US" dirty="0"/>
           </a:p>
@@ -5625,7 +5629,7 @@
             <a:fld id="{48A87A34-81AB-432B-8DAE-1953F412C126}" type="datetimeFigureOut">
               <a:rPr lang="en-US" dirty="0"/>
               <a:pPr/>
-              <a:t>5/5/2017</a:t>
+              <a:t>5/7/2017</a:t>
             </a:fld>
             <a:endParaRPr lang="en-US" dirty="0"/>
           </a:p>
@@ -5700,7 +5704,7 @@
             <a:fld id="{6D22F896-40B5-4ADD-8801-0D06FADFA095}" type="slidenum">
               <a:rPr lang="en-US" dirty="0"/>
               <a:pPr/>
-              <a:t>‹#›</a:t>
+              <a:t>‹N°›</a:t>
             </a:fld>
             <a:endParaRPr lang="en-US" dirty="0"/>
           </a:p>
@@ -6104,11 +6108,7 @@
           <a:p>
             <a:r>
               <a:rPr lang="en-CA" dirty="0"/>
-              <a:t>Kevin Chen, </a:t>
-            </a:r>
-            <a:r>
-              <a:rPr lang="en-CA" dirty="0"/>
-              <a:t>Kapil </a:t>
+              <a:t>Kevin Chen, Kapil </a:t>
             </a:r>
             <a:r>
               <a:rPr lang="en-CA" dirty="0" err="1"/>
@@ -6118,7 +6118,6 @@
               <a:rPr lang="en-CA" dirty="0"/>
               <a:t>, Yu Wu</a:t>
             </a:r>
-            <a:endParaRPr lang="en-CA" dirty="0"/>
           </a:p>
         </p:txBody>
       </p:sp>
@@ -6260,7 +6259,39 @@
           <a:bodyPr/>
           <a:lstStyle/>
           <a:p>
-            <a:endParaRPr lang="en-CA"/>
+            <a:r>
+              <a:rPr lang="en-CA" dirty="0"/>
+              <a:t>Look at market book data and periodically generate signal indicating evolution of stock price</a:t>
+            </a:r>
+          </a:p>
+          <a:p>
+            <a:r>
+              <a:rPr lang="en-CA" dirty="0"/>
+              <a:t>post bid and ask orders adjusted for this evolution</a:t>
+            </a:r>
+          </a:p>
+          <a:p>
+            <a:r>
+              <a:rPr lang="en-CA" dirty="0"/>
+              <a:t>If only one side only is hit after </a:t>
+            </a:r>
+            <a:r>
+              <a:rPr lang="en-US" dirty="0"/>
+              <a:t>a waiting period</a:t>
+            </a:r>
+            <a:r>
+              <a:rPr lang="en-CA" dirty="0"/>
+              <a:t>, cancel order and post new adjusted quotes</a:t>
+            </a:r>
+          </a:p>
+          <a:p>
+            <a:r>
+              <a:rPr lang="en-CA" dirty="0"/>
+              <a:t>Check stop loss</a:t>
+            </a:r>
+          </a:p>
+          <a:p>
+            <a:endParaRPr lang="en-CA" dirty="0"/>
           </a:p>
         </p:txBody>
       </p:sp>
@@ -6302,8 +6333,8 @@
         </p:nvSpPr>
         <p:spPr>
           <a:xfrm>
-            <a:off x="344631" y="862593"/>
-            <a:ext cx="1413164" cy="678873"/>
+            <a:off x="3117041" y="1850339"/>
+            <a:ext cx="1413164" cy="867462"/>
           </a:xfrm>
           <a:prstGeom prst="flowChartAlternateProcess">
             <a:avLst/>
@@ -6345,8 +6376,8 @@
         </p:nvSpPr>
         <p:spPr>
           <a:xfrm>
-            <a:off x="10121364" y="1978751"/>
-            <a:ext cx="1412539" cy="915699"/>
+            <a:off x="10205219" y="1863449"/>
+            <a:ext cx="1412539" cy="854352"/>
           </a:xfrm>
           <a:prstGeom prst="flowChartAlternateProcess">
             <a:avLst/>
@@ -6388,8 +6419,8 @@
         </p:nvSpPr>
         <p:spPr>
           <a:xfrm>
-            <a:off x="7453743" y="4527836"/>
-            <a:ext cx="1814945" cy="678873"/>
+            <a:off x="7833473" y="4686288"/>
+            <a:ext cx="1814945" cy="955963"/>
           </a:xfrm>
           <a:prstGeom prst="flowChartDecision">
             <a:avLst/>
@@ -6423,79 +6454,6 @@
           </a:p>
         </p:txBody>
       </p:sp>
-      <p:cxnSp>
-        <p:nvCxnSpPr>
-          <p:cNvPr id="28" name="Straight Arrow Connector 27"/>
-          <p:cNvCxnSpPr>
-            <a:stCxn id="114" idx="3"/>
-            <a:endCxn id="7" idx="1"/>
-          </p:cNvCxnSpPr>
-          <p:nvPr/>
-        </p:nvCxnSpPr>
-        <p:spPr>
-          <a:xfrm>
-            <a:off x="5209309" y="4732191"/>
-            <a:ext cx="2244434" cy="135082"/>
-          </a:xfrm>
-          <a:prstGeom prst="straightConnector1">
-            <a:avLst/>
-          </a:prstGeom>
-          <a:ln>
-            <a:tailEnd type="triangle"/>
-          </a:ln>
-        </p:spPr>
-        <p:style>
-          <a:lnRef idx="1">
-            <a:schemeClr val="accent1"/>
-          </a:lnRef>
-          <a:fillRef idx="0">
-            <a:schemeClr val="accent1"/>
-          </a:fillRef>
-          <a:effectRef idx="0">
-            <a:schemeClr val="accent1"/>
-          </a:effectRef>
-          <a:fontRef idx="minor">
-            <a:schemeClr val="tx1"/>
-          </a:fontRef>
-        </p:style>
-      </p:cxnSp>
-      <p:cxnSp>
-        <p:nvCxnSpPr>
-          <p:cNvPr id="43" name="Connector: Elbow 42"/>
-          <p:cNvCxnSpPr>
-            <a:stCxn id="7" idx="2"/>
-          </p:cNvCxnSpPr>
-          <p:nvPr/>
-        </p:nvCxnSpPr>
-        <p:spPr>
-          <a:xfrm rot="5400000">
-            <a:off x="4571134" y="1686789"/>
-            <a:ext cx="270163" cy="7310003"/>
-          </a:xfrm>
-          <a:prstGeom prst="bentConnector3">
-            <a:avLst>
-              <a:gd name="adj1" fmla="val 184616"/>
-            </a:avLst>
-          </a:prstGeom>
-          <a:ln>
-            <a:tailEnd type="triangle"/>
-          </a:ln>
-        </p:spPr>
-        <p:style>
-          <a:lnRef idx="1">
-            <a:schemeClr val="accent1"/>
-          </a:lnRef>
-          <a:fillRef idx="0">
-            <a:schemeClr val="accent1"/>
-          </a:fillRef>
-          <a:effectRef idx="0">
-            <a:schemeClr val="accent1"/>
-          </a:effectRef>
-          <a:fontRef idx="minor">
-            <a:schemeClr val="tx1"/>
-          </a:fontRef>
-        </p:style>
-      </p:cxnSp>
       <p:sp>
         <p:nvSpPr>
           <p:cNvPr id="55" name="Rectangle 54"/>
@@ -6504,8 +6462,8 @@
         </p:nvSpPr>
         <p:spPr>
           <a:xfrm>
-            <a:off x="10037613" y="4398815"/>
-            <a:ext cx="1496291" cy="936914"/>
+            <a:off x="10163343" y="4686288"/>
+            <a:ext cx="1496291" cy="955962"/>
           </a:xfrm>
           <a:prstGeom prst="rect">
             <a:avLst/>
@@ -6541,17 +6499,18 @@
       </p:sp>
       <p:cxnSp>
         <p:nvCxnSpPr>
-          <p:cNvPr id="73" name="Straight Arrow Connector 72"/>
+          <p:cNvPr id="75" name="Straight Arrow Connector 74"/>
           <p:cNvCxnSpPr>
-            <a:stCxn id="7" idx="3"/>
-            <a:endCxn id="55" idx="1"/>
+            <a:cxnSpLocks/>
+            <a:stCxn id="55" idx="0"/>
+            <a:endCxn id="5" idx="2"/>
           </p:cNvCxnSpPr>
           <p:nvPr/>
         </p:nvCxnSpPr>
         <p:spPr>
           <a:xfrm flipV="1">
-            <a:off x="9268688" y="4867272"/>
-            <a:ext cx="768925" cy="1"/>
+            <a:off x="10911489" y="2717801"/>
+            <a:ext cx="0" cy="1968487"/>
           </a:xfrm>
           <a:prstGeom prst="straightConnector1">
             <a:avLst/>
@@ -6575,42 +6534,6 @@
           </a:fontRef>
         </p:style>
       </p:cxnSp>
-      <p:cxnSp>
-        <p:nvCxnSpPr>
-          <p:cNvPr id="75" name="Straight Arrow Connector 74"/>
-          <p:cNvCxnSpPr>
-            <a:stCxn id="55" idx="0"/>
-            <a:endCxn id="5" idx="2"/>
-          </p:cNvCxnSpPr>
-          <p:nvPr/>
-        </p:nvCxnSpPr>
-        <p:spPr>
-          <a:xfrm flipV="1">
-            <a:off x="10785759" y="2894450"/>
-            <a:ext cx="41875" cy="1504365"/>
-          </a:xfrm>
-          <a:prstGeom prst="straightConnector1">
-            <a:avLst/>
-          </a:prstGeom>
-          <a:ln>
-            <a:tailEnd type="triangle"/>
-          </a:ln>
-        </p:spPr>
-        <p:style>
-          <a:lnRef idx="1">
-            <a:schemeClr val="accent1"/>
-          </a:lnRef>
-          <a:fillRef idx="0">
-            <a:schemeClr val="accent1"/>
-          </a:fillRef>
-          <a:effectRef idx="0">
-            <a:schemeClr val="accent1"/>
-          </a:effectRef>
-          <a:fontRef idx="minor">
-            <a:schemeClr val="tx1"/>
-          </a:fontRef>
-        </p:style>
-      </p:cxnSp>
       <p:sp>
         <p:nvSpPr>
           <p:cNvPr id="78" name="Title 77"/>
@@ -6646,8 +6569,8 @@
         </p:nvSpPr>
         <p:spPr>
           <a:xfrm>
-            <a:off x="169718" y="2324400"/>
-            <a:ext cx="1762991" cy="930703"/>
+            <a:off x="2942128" y="3187953"/>
+            <a:ext cx="1762991" cy="953343"/>
           </a:xfrm>
           <a:prstGeom prst="rect">
             <a:avLst/>
@@ -6685,6 +6608,7 @@
         <p:nvCxnSpPr>
           <p:cNvPr id="97" name="Straight Arrow Connector 96"/>
           <p:cNvCxnSpPr>
+            <a:cxnSpLocks/>
             <a:stCxn id="4" idx="2"/>
             <a:endCxn id="95" idx="0"/>
           </p:cNvCxnSpPr>
@@ -6692,8 +6616,8 @@
         </p:nvCxnSpPr>
         <p:spPr>
           <a:xfrm>
-            <a:off x="1051213" y="1541466"/>
-            <a:ext cx="1" cy="782934"/>
+            <a:off x="3823623" y="2717801"/>
+            <a:ext cx="1" cy="470152"/>
           </a:xfrm>
           <a:prstGeom prst="straightConnector1">
             <a:avLst/>
@@ -6721,14 +6645,16 @@
         <p:nvCxnSpPr>
           <p:cNvPr id="99" name="Straight Arrow Connector 98"/>
           <p:cNvCxnSpPr>
+            <a:cxnSpLocks/>
             <a:stCxn id="95" idx="2"/>
+            <a:endCxn id="113" idx="0"/>
           </p:cNvCxnSpPr>
           <p:nvPr/>
         </p:nvCxnSpPr>
         <p:spPr>
-          <a:xfrm flipH="1">
-            <a:off x="1051213" y="3255103"/>
-            <a:ext cx="1" cy="1002569"/>
+          <a:xfrm>
+            <a:off x="3823624" y="4141296"/>
+            <a:ext cx="0" cy="544992"/>
           </a:xfrm>
           <a:prstGeom prst="straightConnector1">
             <a:avLst/>
@@ -6760,8 +6686,8 @@
         </p:nvSpPr>
         <p:spPr>
           <a:xfrm>
-            <a:off x="344631" y="4257672"/>
-            <a:ext cx="1572491" cy="1219201"/>
+            <a:off x="3037378" y="4686288"/>
+            <a:ext cx="1572491" cy="955962"/>
           </a:xfrm>
           <a:prstGeom prst="flowChartPredefinedProcess">
             <a:avLst/>
@@ -6803,8 +6729,8 @@
         </p:nvSpPr>
         <p:spPr>
           <a:xfrm>
-            <a:off x="3359725" y="4051154"/>
-            <a:ext cx="1849584" cy="1362073"/>
+            <a:off x="5339655" y="4689472"/>
+            <a:ext cx="1849584" cy="955595"/>
           </a:xfrm>
           <a:prstGeom prst="flowChartPredefinedProcess">
             <a:avLst/>
@@ -6842,15 +6768,302 @@
         <p:nvCxnSpPr>
           <p:cNvPr id="116" name="Straight Arrow Connector 115"/>
           <p:cNvCxnSpPr>
+            <a:cxnSpLocks/>
             <a:stCxn id="113" idx="3"/>
             <a:endCxn id="114" idx="1"/>
           </p:cNvCxnSpPr>
           <p:nvPr/>
         </p:nvCxnSpPr>
         <p:spPr>
+          <a:xfrm>
+            <a:off x="4609869" y="5164269"/>
+            <a:ext cx="729786" cy="3001"/>
+          </a:xfrm>
+          <a:prstGeom prst="straightConnector1">
+            <a:avLst/>
+          </a:prstGeom>
+          <a:ln>
+            <a:tailEnd type="triangle"/>
+          </a:ln>
+        </p:spPr>
+        <p:style>
+          <a:lnRef idx="1">
+            <a:schemeClr val="accent1"/>
+          </a:lnRef>
+          <a:fillRef idx="0">
+            <a:schemeClr val="accent1"/>
+          </a:fillRef>
+          <a:effectRef idx="0">
+            <a:schemeClr val="accent1"/>
+          </a:effectRef>
+          <a:fontRef idx="minor">
+            <a:schemeClr val="tx1"/>
+          </a:fontRef>
+        </p:style>
+      </p:cxnSp>
+      <p:cxnSp>
+        <p:nvCxnSpPr>
+          <p:cNvPr id="33" name="Connecteur : en angle 32"/>
+          <p:cNvCxnSpPr>
+            <a:cxnSpLocks/>
+            <a:stCxn id="7" idx="2"/>
+            <a:endCxn id="113" idx="2"/>
+          </p:cNvCxnSpPr>
+          <p:nvPr/>
+        </p:nvCxnSpPr>
+        <p:spPr>
+          <a:xfrm rot="5400000" flipH="1">
+            <a:off x="6282284" y="3183590"/>
+            <a:ext cx="1" cy="4917322"/>
+          </a:xfrm>
+          <a:prstGeom prst="bentConnector3">
+            <a:avLst>
+              <a:gd name="adj1" fmla="val -22860000000"/>
+            </a:avLst>
+          </a:prstGeom>
+          <a:ln>
+            <a:tailEnd type="triangle"/>
+          </a:ln>
+        </p:spPr>
+        <p:style>
+          <a:lnRef idx="1">
+            <a:schemeClr val="accent1"/>
+          </a:lnRef>
+          <a:fillRef idx="0">
+            <a:schemeClr val="accent1"/>
+          </a:fillRef>
+          <a:effectRef idx="0">
+            <a:schemeClr val="accent1"/>
+          </a:effectRef>
+          <a:fontRef idx="minor">
+            <a:schemeClr val="tx1"/>
+          </a:fontRef>
+        </p:style>
+      </p:cxnSp>
+      <p:cxnSp>
+        <p:nvCxnSpPr>
+          <p:cNvPr id="51" name="Connecteur droit avec flèche 50"/>
+          <p:cNvCxnSpPr>
+            <a:cxnSpLocks/>
+            <a:stCxn id="114" idx="3"/>
+            <a:endCxn id="7" idx="1"/>
+          </p:cNvCxnSpPr>
+          <p:nvPr/>
+        </p:nvCxnSpPr>
+        <p:spPr>
           <a:xfrm flipV="1">
-            <a:off x="1917122" y="4732191"/>
-            <a:ext cx="1442603" cy="135082"/>
+            <a:off x="7189239" y="5164270"/>
+            <a:ext cx="644234" cy="3000"/>
+          </a:xfrm>
+          <a:prstGeom prst="straightConnector1">
+            <a:avLst/>
+          </a:prstGeom>
+          <a:ln>
+            <a:tailEnd type="triangle"/>
+          </a:ln>
+        </p:spPr>
+        <p:style>
+          <a:lnRef idx="1">
+            <a:schemeClr val="accent1"/>
+          </a:lnRef>
+          <a:fillRef idx="0">
+            <a:schemeClr val="accent1"/>
+          </a:fillRef>
+          <a:effectRef idx="0">
+            <a:schemeClr val="accent1"/>
+          </a:effectRef>
+          <a:fontRef idx="minor">
+            <a:schemeClr val="tx1"/>
+          </a:fontRef>
+        </p:style>
+      </p:cxnSp>
+      <p:cxnSp>
+        <p:nvCxnSpPr>
+          <p:cNvPr id="59" name="Connecteur droit avec flèche 58"/>
+          <p:cNvCxnSpPr>
+            <a:cxnSpLocks/>
+            <a:stCxn id="7" idx="3"/>
+            <a:endCxn id="55" idx="1"/>
+          </p:cNvCxnSpPr>
+          <p:nvPr/>
+        </p:nvCxnSpPr>
+        <p:spPr>
+          <a:xfrm flipV="1">
+            <a:off x="9648418" y="5164269"/>
+            <a:ext cx="514925" cy="1"/>
+          </a:xfrm>
+          <a:prstGeom prst="straightConnector1">
+            <a:avLst/>
+          </a:prstGeom>
+          <a:ln>
+            <a:tailEnd type="triangle"/>
+          </a:ln>
+        </p:spPr>
+        <p:style>
+          <a:lnRef idx="1">
+            <a:schemeClr val="accent1"/>
+          </a:lnRef>
+          <a:fillRef idx="0">
+            <a:schemeClr val="accent1"/>
+          </a:fillRef>
+          <a:effectRef idx="0">
+            <a:schemeClr val="accent1"/>
+          </a:effectRef>
+          <a:fontRef idx="minor">
+            <a:schemeClr val="tx1"/>
+          </a:fontRef>
+        </p:style>
+      </p:cxnSp>
+      <p:sp>
+        <p:nvSpPr>
+          <p:cNvPr id="119" name="Flowchart: Data 4"/>
+          <p:cNvSpPr/>
+          <p:nvPr/>
+        </p:nvSpPr>
+        <p:spPr>
+          <a:xfrm>
+            <a:off x="662431" y="4686288"/>
+            <a:ext cx="2014730" cy="955964"/>
+          </a:xfrm>
+          <a:prstGeom prst="flowChartInputOutput">
+            <a:avLst/>
+          </a:prstGeom>
+        </p:spPr>
+        <p:style>
+          <a:lnRef idx="2">
+            <a:schemeClr val="accent1">
+              <a:shade val="50000"/>
+            </a:schemeClr>
+          </a:lnRef>
+          <a:fillRef idx="1">
+            <a:schemeClr val="accent1"/>
+          </a:fillRef>
+          <a:effectRef idx="0">
+            <a:schemeClr val="accent1"/>
+          </a:effectRef>
+          <a:fontRef idx="minor">
+            <a:schemeClr val="lt1"/>
+          </a:fontRef>
+        </p:style>
+        <p:txBody>
+          <a:bodyPr rtlCol="0" anchor="ctr"/>
+          <a:lstStyle/>
+          <a:p>
+            <a:pPr algn="ctr"/>
+            <a:r>
+              <a:rPr lang="en-CA" dirty="0"/>
+              <a:t>Current</a:t>
+            </a:r>
+          </a:p>
+          <a:p>
+            <a:pPr algn="ctr"/>
+            <a:r>
+              <a:rPr lang="en-CA" dirty="0"/>
+              <a:t>Orderbook Data</a:t>
+            </a:r>
+          </a:p>
+        </p:txBody>
+      </p:sp>
+      <p:cxnSp>
+        <p:nvCxnSpPr>
+          <p:cNvPr id="129" name="Connecteur droit avec flèche 128"/>
+          <p:cNvCxnSpPr>
+            <a:cxnSpLocks/>
+            <a:stCxn id="119" idx="5"/>
+            <a:endCxn id="113" idx="1"/>
+          </p:cNvCxnSpPr>
+          <p:nvPr/>
+        </p:nvCxnSpPr>
+        <p:spPr>
+          <a:xfrm flipV="1">
+            <a:off x="2475688" y="5164269"/>
+            <a:ext cx="561690" cy="1"/>
+          </a:xfrm>
+          <a:prstGeom prst="straightConnector1">
+            <a:avLst/>
+          </a:prstGeom>
+          <a:ln>
+            <a:tailEnd type="triangle"/>
+          </a:ln>
+        </p:spPr>
+        <p:style>
+          <a:lnRef idx="1">
+            <a:schemeClr val="accent1"/>
+          </a:lnRef>
+          <a:fillRef idx="0">
+            <a:schemeClr val="accent1"/>
+          </a:fillRef>
+          <a:effectRef idx="0">
+            <a:schemeClr val="accent1"/>
+          </a:effectRef>
+          <a:fontRef idx="minor">
+            <a:schemeClr val="tx1"/>
+          </a:fontRef>
+        </p:style>
+      </p:cxnSp>
+      <p:sp>
+        <p:nvSpPr>
+          <p:cNvPr id="148" name="Flowchart: Data 4"/>
+          <p:cNvSpPr/>
+          <p:nvPr/>
+        </p:nvSpPr>
+        <p:spPr>
+          <a:xfrm>
+            <a:off x="662431" y="3185332"/>
+            <a:ext cx="2014730" cy="955964"/>
+          </a:xfrm>
+          <a:prstGeom prst="flowChartInputOutput">
+            <a:avLst/>
+          </a:prstGeom>
+        </p:spPr>
+        <p:style>
+          <a:lnRef idx="2">
+            <a:schemeClr val="accent1">
+              <a:shade val="50000"/>
+            </a:schemeClr>
+          </a:lnRef>
+          <a:fillRef idx="1">
+            <a:schemeClr val="accent1"/>
+          </a:fillRef>
+          <a:effectRef idx="0">
+            <a:schemeClr val="accent1"/>
+          </a:effectRef>
+          <a:fontRef idx="minor">
+            <a:schemeClr val="lt1"/>
+          </a:fontRef>
+        </p:style>
+        <p:txBody>
+          <a:bodyPr rtlCol="0" anchor="ctr"/>
+          <a:lstStyle/>
+          <a:p>
+            <a:pPr algn="ctr"/>
+            <a:r>
+              <a:rPr lang="en-CA" dirty="0"/>
+              <a:t>Historical</a:t>
+            </a:r>
+          </a:p>
+          <a:p>
+            <a:pPr algn="ctr"/>
+            <a:r>
+              <a:rPr lang="en-CA" dirty="0"/>
+              <a:t>Orderbook Data</a:t>
+            </a:r>
+          </a:p>
+        </p:txBody>
+      </p:sp>
+      <p:cxnSp>
+        <p:nvCxnSpPr>
+          <p:cNvPr id="158" name="Connecteur droit avec flèche 157"/>
+          <p:cNvCxnSpPr>
+            <a:stCxn id="148" idx="5"/>
+            <a:endCxn id="95" idx="1"/>
+          </p:cNvCxnSpPr>
+          <p:nvPr/>
+        </p:nvCxnSpPr>
+        <p:spPr>
+          <a:xfrm>
+            <a:off x="2475688" y="3663314"/>
+            <a:ext cx="466440" cy="1311"/>
           </a:xfrm>
           <a:prstGeom prst="straightConnector1">
             <a:avLst/>
@@ -6914,7 +7127,12 @@
             <p:ph type="title"/>
           </p:nvPr>
         </p:nvSpPr>
-        <p:spPr/>
+        <p:spPr>
+          <a:xfrm>
+            <a:off x="913775" y="391951"/>
+            <a:ext cx="10364451" cy="1596177"/>
+          </a:xfrm>
+        </p:spPr>
         <p:txBody>
           <a:bodyPr/>
           <a:lstStyle/>
@@ -6934,8 +7152,8 @@
         </p:nvSpPr>
         <p:spPr>
           <a:xfrm>
-            <a:off x="913775" y="2590800"/>
-            <a:ext cx="2161934" cy="955964"/>
+            <a:off x="695961" y="1995055"/>
+            <a:ext cx="2185160" cy="955964"/>
           </a:xfrm>
           <a:prstGeom prst="flowChartInputOutput">
             <a:avLst/>
@@ -6964,7 +7182,7 @@
             <a:pPr algn="ctr"/>
             <a:r>
               <a:rPr lang="en-CA" dirty="0"/>
-              <a:t> Orderbook Data</a:t>
+              <a:t>Current Orderbook Data</a:t>
             </a:r>
           </a:p>
         </p:txBody>
@@ -6977,8 +7195,8 @@
         </p:nvSpPr>
         <p:spPr>
           <a:xfrm>
-            <a:off x="1011069" y="4059382"/>
-            <a:ext cx="1967345" cy="1066800"/>
+            <a:off x="695962" y="4789704"/>
+            <a:ext cx="2185159" cy="1066800"/>
           </a:xfrm>
           <a:prstGeom prst="rect">
             <a:avLst/>
@@ -7020,8 +7238,8 @@
         </p:nvSpPr>
         <p:spPr>
           <a:xfrm>
-            <a:off x="3955472" y="4184073"/>
-            <a:ext cx="2272146" cy="942109"/>
+            <a:off x="3737262" y="4789705"/>
+            <a:ext cx="2023688" cy="1066799"/>
           </a:xfrm>
           <a:prstGeom prst="flowChartDecision">
             <a:avLst/>
@@ -7050,7 +7268,7 @@
             <a:pPr algn="ctr"/>
             <a:r>
               <a:rPr lang="en-CA" dirty="0"/>
-              <a:t>If signal changed</a:t>
+              <a:t>Signal changed</a:t>
             </a:r>
           </a:p>
         </p:txBody>
@@ -7063,8 +7281,8 @@
         </p:nvSpPr>
         <p:spPr>
           <a:xfrm>
-            <a:off x="3955472" y="2583873"/>
-            <a:ext cx="1898073" cy="962891"/>
+            <a:off x="3737262" y="3356033"/>
+            <a:ext cx="2023688" cy="962891"/>
           </a:xfrm>
           <a:prstGeom prst="flowChartProcess">
             <a:avLst/>
@@ -7106,8 +7324,8 @@
         </p:nvSpPr>
         <p:spPr>
           <a:xfrm>
-            <a:off x="6570517" y="2570018"/>
-            <a:ext cx="1842655" cy="962891"/>
+            <a:off x="3737262" y="1995055"/>
+            <a:ext cx="2023688" cy="955964"/>
           </a:xfrm>
           <a:prstGeom prst="flowChartProcess">
             <a:avLst/>
@@ -7149,7 +7367,7 @@
         </p:nvSpPr>
         <p:spPr>
           <a:xfrm>
-            <a:off x="9130144" y="2523974"/>
+            <a:off x="9421716" y="3354185"/>
             <a:ext cx="1856510" cy="962891"/>
           </a:xfrm>
           <a:prstGeom prst="flowChartProcess">
@@ -7186,43 +7404,9 @@
       </p:sp>
       <p:cxnSp>
         <p:nvCxnSpPr>
-          <p:cNvPr id="13" name="Straight Arrow Connector 12"/>
-          <p:cNvCxnSpPr>
-            <a:stCxn id="5" idx="4"/>
-          </p:cNvCxnSpPr>
-          <p:nvPr/>
-        </p:nvCxnSpPr>
-        <p:spPr>
-          <a:xfrm flipH="1">
-            <a:off x="1994741" y="3546764"/>
-            <a:ext cx="1" cy="637309"/>
-          </a:xfrm>
-          <a:prstGeom prst="straightConnector1">
-            <a:avLst/>
-          </a:prstGeom>
-          <a:ln>
-            <a:tailEnd type="triangle"/>
-          </a:ln>
-        </p:spPr>
-        <p:style>
-          <a:lnRef idx="1">
-            <a:schemeClr val="accent1"/>
-          </a:lnRef>
-          <a:fillRef idx="0">
-            <a:schemeClr val="accent1"/>
-          </a:fillRef>
-          <a:effectRef idx="0">
-            <a:schemeClr val="accent1"/>
-          </a:effectRef>
-          <a:fontRef idx="minor">
-            <a:schemeClr val="tx1"/>
-          </a:fontRef>
-        </p:style>
-      </p:cxnSp>
-      <p:cxnSp>
-        <p:nvCxnSpPr>
           <p:cNvPr id="15" name="Straight Arrow Connector 14"/>
           <p:cNvCxnSpPr>
+            <a:cxnSpLocks/>
             <a:stCxn id="6" idx="3"/>
             <a:endCxn id="7" idx="1"/>
           </p:cNvCxnSpPr>
@@ -7230,8 +7414,8 @@
         </p:nvCxnSpPr>
         <p:spPr>
           <a:xfrm>
-            <a:off x="2978414" y="4592782"/>
-            <a:ext cx="977058" cy="62346"/>
+            <a:off x="2881121" y="5323104"/>
+            <a:ext cx="856141" cy="1"/>
           </a:xfrm>
           <a:prstGeom prst="straightConnector1">
             <a:avLst/>
@@ -7259,15 +7443,16 @@
         <p:nvCxnSpPr>
           <p:cNvPr id="17" name="Straight Arrow Connector 16"/>
           <p:cNvCxnSpPr>
+            <a:cxnSpLocks/>
             <a:stCxn id="7" idx="0"/>
             <a:endCxn id="9" idx="2"/>
           </p:cNvCxnSpPr>
           <p:nvPr/>
         </p:nvCxnSpPr>
         <p:spPr>
-          <a:xfrm flipH="1" flipV="1">
-            <a:off x="4904509" y="3546764"/>
-            <a:ext cx="187036" cy="637309"/>
+          <a:xfrm flipV="1">
+            <a:off x="4749106" y="4318924"/>
+            <a:ext cx="0" cy="470781"/>
           </a:xfrm>
           <a:prstGeom prst="straightConnector1">
             <a:avLst/>
@@ -7295,51 +7480,16 @@
         <p:nvCxnSpPr>
           <p:cNvPr id="19" name="Straight Arrow Connector 18"/>
           <p:cNvCxnSpPr>
-            <a:stCxn id="9" idx="3"/>
-            <a:endCxn id="10" idx="1"/>
+            <a:cxnSpLocks/>
+            <a:stCxn id="9" idx="0"/>
+            <a:endCxn id="10" idx="2"/>
           </p:cNvCxnSpPr>
           <p:nvPr/>
         </p:nvCxnSpPr>
         <p:spPr>
           <a:xfrm flipV="1">
-            <a:off x="5853545" y="3051464"/>
-            <a:ext cx="716972" cy="13855"/>
-          </a:xfrm>
-          <a:prstGeom prst="straightConnector1">
-            <a:avLst/>
-          </a:prstGeom>
-          <a:ln>
-            <a:tailEnd type="triangle"/>
-          </a:ln>
-        </p:spPr>
-        <p:style>
-          <a:lnRef idx="1">
-            <a:schemeClr val="accent1"/>
-          </a:lnRef>
-          <a:fillRef idx="0">
-            <a:schemeClr val="accent1"/>
-          </a:fillRef>
-          <a:effectRef idx="0">
-            <a:schemeClr val="accent1"/>
-          </a:effectRef>
-          <a:fontRef idx="minor">
-            <a:schemeClr val="tx1"/>
-          </a:fontRef>
-        </p:style>
-      </p:cxnSp>
-      <p:cxnSp>
-        <p:nvCxnSpPr>
-          <p:cNvPr id="21" name="Straight Arrow Connector 20"/>
-          <p:cNvCxnSpPr>
-            <a:stCxn id="10" idx="3"/>
-            <a:endCxn id="11" idx="1"/>
-          </p:cNvCxnSpPr>
-          <p:nvPr/>
-        </p:nvCxnSpPr>
-        <p:spPr>
-          <a:xfrm flipV="1">
-            <a:off x="8413172" y="3005420"/>
-            <a:ext cx="716972" cy="46044"/>
+            <a:off x="4749106" y="2951019"/>
+            <a:ext cx="0" cy="405014"/>
           </a:xfrm>
           <a:prstGeom prst="straightConnector1">
             <a:avLst/>
@@ -7367,14 +7517,136 @@
         <p:nvCxnSpPr>
           <p:cNvPr id="23" name="Straight Arrow Connector 22"/>
           <p:cNvCxnSpPr>
+            <a:cxnSpLocks/>
             <a:stCxn id="7" idx="3"/>
           </p:cNvCxnSpPr>
           <p:nvPr/>
         </p:nvCxnSpPr>
         <p:spPr>
-          <a:xfrm flipV="1">
-            <a:off x="6227618" y="4655127"/>
-            <a:ext cx="5784273" cy="1"/>
+          <a:xfrm>
+            <a:off x="5760950" y="5323105"/>
+            <a:ext cx="6002021" cy="62345"/>
+          </a:xfrm>
+          <a:prstGeom prst="straightConnector1">
+            <a:avLst/>
+          </a:prstGeom>
+          <a:ln>
+            <a:tailEnd type="triangle"/>
+          </a:ln>
+        </p:spPr>
+        <p:style>
+          <a:lnRef idx="1">
+            <a:schemeClr val="accent1"/>
+          </a:lnRef>
+          <a:fillRef idx="0">
+            <a:schemeClr val="accent1"/>
+          </a:fillRef>
+          <a:effectRef idx="0">
+            <a:schemeClr val="accent1"/>
+          </a:effectRef>
+          <a:fontRef idx="minor">
+            <a:schemeClr val="tx1"/>
+          </a:fontRef>
+        </p:style>
+      </p:cxnSp>
+      <p:sp>
+        <p:nvSpPr>
+          <p:cNvPr id="33" name="Flowchart: Decision 6"/>
+          <p:cNvSpPr/>
+          <p:nvPr/>
+        </p:nvSpPr>
+        <p:spPr>
+          <a:xfrm>
+            <a:off x="6566291" y="1995056"/>
+            <a:ext cx="2277989" cy="962198"/>
+          </a:xfrm>
+          <a:prstGeom prst="flowChartDecision">
+            <a:avLst/>
+          </a:prstGeom>
+        </p:spPr>
+        <p:style>
+          <a:lnRef idx="2">
+            <a:schemeClr val="accent1">
+              <a:shade val="50000"/>
+            </a:schemeClr>
+          </a:lnRef>
+          <a:fillRef idx="1">
+            <a:schemeClr val="accent1"/>
+          </a:fillRef>
+          <a:effectRef idx="0">
+            <a:schemeClr val="accent1"/>
+          </a:effectRef>
+          <a:fontRef idx="minor">
+            <a:schemeClr val="lt1"/>
+          </a:fontRef>
+        </p:style>
+        <p:txBody>
+          <a:bodyPr rtlCol="0" anchor="ctr"/>
+          <a:lstStyle/>
+          <a:p>
+            <a:pPr algn="ctr"/>
+            <a:r>
+              <a:rPr lang="en-CA" dirty="0"/>
+              <a:t>Stop loss needed</a:t>
+            </a:r>
+          </a:p>
+        </p:txBody>
+      </p:sp>
+      <p:sp>
+        <p:nvSpPr>
+          <p:cNvPr id="34" name="Flowchart: Process 8"/>
+          <p:cNvSpPr/>
+          <p:nvPr/>
+        </p:nvSpPr>
+        <p:spPr>
+          <a:xfrm>
+            <a:off x="6798928" y="3354186"/>
+            <a:ext cx="1812714" cy="962891"/>
+          </a:xfrm>
+          <a:prstGeom prst="flowChartProcess">
+            <a:avLst/>
+          </a:prstGeom>
+        </p:spPr>
+        <p:style>
+          <a:lnRef idx="2">
+            <a:schemeClr val="accent1">
+              <a:shade val="50000"/>
+            </a:schemeClr>
+          </a:lnRef>
+          <a:fillRef idx="1">
+            <a:schemeClr val="accent1"/>
+          </a:fillRef>
+          <a:effectRef idx="0">
+            <a:schemeClr val="accent1"/>
+          </a:effectRef>
+          <a:fontRef idx="minor">
+            <a:schemeClr val="lt1"/>
+          </a:fontRef>
+        </p:style>
+        <p:txBody>
+          <a:bodyPr rtlCol="0" anchor="ctr"/>
+          <a:lstStyle/>
+          <a:p>
+            <a:pPr algn="ctr"/>
+            <a:r>
+              <a:rPr lang="en-CA" dirty="0"/>
+              <a:t>Unwind position</a:t>
+            </a:r>
+          </a:p>
+        </p:txBody>
+      </p:sp>
+      <p:cxnSp>
+        <p:nvCxnSpPr>
+          <p:cNvPr id="51" name="Connecteur droit avec flèche 50"/>
+          <p:cNvCxnSpPr>
+            <a:cxnSpLocks/>
+          </p:cNvCxnSpPr>
+          <p:nvPr/>
+        </p:nvCxnSpPr>
+        <p:spPr>
+          <a:xfrm>
+            <a:off x="1788541" y="2951019"/>
+            <a:ext cx="0" cy="1838685"/>
           </a:xfrm>
           <a:prstGeom prst="straightConnector1">
             <a:avLst/>
@@ -7400,16 +7672,125 @@
       </p:cxnSp>
       <p:cxnSp>
         <p:nvCxnSpPr>
-          <p:cNvPr id="25" name="Connector: Elbow 24"/>
+          <p:cNvPr id="78" name="Connecteur droit avec flèche 77"/>
           <p:cNvCxnSpPr>
-            <a:stCxn id="11" idx="3"/>
+            <a:stCxn id="10" idx="3"/>
+            <a:endCxn id="33" idx="1"/>
           </p:cNvCxnSpPr>
           <p:nvPr/>
         </p:nvCxnSpPr>
         <p:spPr>
           <a:xfrm>
-            <a:off x="10986654" y="3005420"/>
-            <a:ext cx="568037" cy="1646243"/>
+            <a:off x="5760950" y="2473037"/>
+            <a:ext cx="805341" cy="3118"/>
+          </a:xfrm>
+          <a:prstGeom prst="straightConnector1">
+            <a:avLst/>
+          </a:prstGeom>
+          <a:ln>
+            <a:tailEnd type="triangle"/>
+          </a:ln>
+        </p:spPr>
+        <p:style>
+          <a:lnRef idx="1">
+            <a:schemeClr val="accent1"/>
+          </a:lnRef>
+          <a:fillRef idx="0">
+            <a:schemeClr val="accent1"/>
+          </a:fillRef>
+          <a:effectRef idx="0">
+            <a:schemeClr val="accent1"/>
+          </a:effectRef>
+          <a:fontRef idx="minor">
+            <a:schemeClr val="tx1"/>
+          </a:fontRef>
+        </p:style>
+      </p:cxnSp>
+      <p:cxnSp>
+        <p:nvCxnSpPr>
+          <p:cNvPr id="80" name="Connecteur droit avec flèche 79"/>
+          <p:cNvCxnSpPr>
+            <a:stCxn id="33" idx="2"/>
+            <a:endCxn id="34" idx="0"/>
+          </p:cNvCxnSpPr>
+          <p:nvPr/>
+        </p:nvCxnSpPr>
+        <p:spPr>
+          <a:xfrm flipH="1">
+            <a:off x="7705285" y="2957254"/>
+            <a:ext cx="1" cy="396932"/>
+          </a:xfrm>
+          <a:prstGeom prst="straightConnector1">
+            <a:avLst/>
+          </a:prstGeom>
+          <a:ln>
+            <a:tailEnd type="triangle"/>
+          </a:ln>
+        </p:spPr>
+        <p:style>
+          <a:lnRef idx="1">
+            <a:schemeClr val="accent1"/>
+          </a:lnRef>
+          <a:fillRef idx="0">
+            <a:schemeClr val="accent1"/>
+          </a:fillRef>
+          <a:effectRef idx="0">
+            <a:schemeClr val="accent1"/>
+          </a:effectRef>
+          <a:fontRef idx="minor">
+            <a:schemeClr val="tx1"/>
+          </a:fontRef>
+        </p:style>
+      </p:cxnSp>
+      <p:cxnSp>
+        <p:nvCxnSpPr>
+          <p:cNvPr id="82" name="Connecteur droit avec flèche 81"/>
+          <p:cNvCxnSpPr>
+            <a:stCxn id="34" idx="3"/>
+            <a:endCxn id="11" idx="1"/>
+          </p:cNvCxnSpPr>
+          <p:nvPr/>
+        </p:nvCxnSpPr>
+        <p:spPr>
+          <a:xfrm flipV="1">
+            <a:off x="8611642" y="3835631"/>
+            <a:ext cx="810074" cy="1"/>
+          </a:xfrm>
+          <a:prstGeom prst="straightConnector1">
+            <a:avLst/>
+          </a:prstGeom>
+          <a:ln>
+            <a:tailEnd type="triangle"/>
+          </a:ln>
+        </p:spPr>
+        <p:style>
+          <a:lnRef idx="1">
+            <a:schemeClr val="accent1"/>
+          </a:lnRef>
+          <a:fillRef idx="0">
+            <a:schemeClr val="accent1"/>
+          </a:fillRef>
+          <a:effectRef idx="0">
+            <a:schemeClr val="accent1"/>
+          </a:effectRef>
+          <a:fontRef idx="minor">
+            <a:schemeClr val="tx1"/>
+          </a:fontRef>
+        </p:style>
+      </p:cxnSp>
+      <p:cxnSp>
+        <p:nvCxnSpPr>
+          <p:cNvPr id="84" name="Connecteur : en angle 83"/>
+          <p:cNvCxnSpPr>
+            <a:stCxn id="33" idx="3"/>
+            <a:endCxn id="11" idx="0"/>
+          </p:cNvCxnSpPr>
+          <p:nvPr/>
+        </p:nvCxnSpPr>
+        <p:spPr>
+          <a:xfrm>
+            <a:off x="8844280" y="2476155"/>
+            <a:ext cx="1505691" cy="878030"/>
           </a:xfrm>
           <a:prstGeom prst="bentConnector2">
             <a:avLst/>
@@ -7417,6 +7798,39 @@
           <a:ln>
             <a:tailEnd type="triangle"/>
           </a:ln>
+        </p:spPr>
+        <p:style>
+          <a:lnRef idx="1">
+            <a:schemeClr val="accent1"/>
+          </a:lnRef>
+          <a:fillRef idx="0">
+            <a:schemeClr val="accent1"/>
+          </a:fillRef>
+          <a:effectRef idx="0">
+            <a:schemeClr val="accent1"/>
+          </a:effectRef>
+          <a:fontRef idx="minor">
+            <a:schemeClr val="tx1"/>
+          </a:fontRef>
+        </p:style>
+      </p:cxnSp>
+      <p:cxnSp>
+        <p:nvCxnSpPr>
+          <p:cNvPr id="86" name="Connecteur droit 85"/>
+          <p:cNvCxnSpPr>
+            <a:cxnSpLocks/>
+            <a:stCxn id="11" idx="2"/>
+          </p:cNvCxnSpPr>
+          <p:nvPr/>
+        </p:nvCxnSpPr>
+        <p:spPr>
+          <a:xfrm>
+            <a:off x="10349971" y="4317076"/>
+            <a:ext cx="0" cy="1068374"/>
+          </a:xfrm>
+          <a:prstGeom prst="line">
+            <a:avLst/>
+          </a:prstGeom>
         </p:spPr>
         <p:style>
           <a:lnRef idx="1">

</xml_diff>